<commit_message>
Fix all sliders up to P1C3 while loop for consistency of background, use of stickies, and code indentation.
</commit_message>
<xml_diff>
--- a/resources/ppt-slides/control-flow-if-else-if-statement.pptx
+++ b/resources/ppt-slides/control-flow-if-else-if-statement.pptx
@@ -254,7 +254,7 @@
           <a:p>
             <a:fld id="{964302DC-9F53-934F-AE4D-0F1F197008C1}" type="datetimeFigureOut">
               <a:rPr lang="en-US" smtClean="0"/>
-              <a:t>2/2/24</a:t>
+              <a:t>2/9/24</a:t>
             </a:fld>
             <a:endParaRPr lang="en-US"/>
           </a:p>
@@ -424,7 +424,7 @@
           <a:p>
             <a:fld id="{964302DC-9F53-934F-AE4D-0F1F197008C1}" type="datetimeFigureOut">
               <a:rPr lang="en-US" smtClean="0"/>
-              <a:t>2/2/24</a:t>
+              <a:t>2/9/24</a:t>
             </a:fld>
             <a:endParaRPr lang="en-US"/>
           </a:p>
@@ -604,7 +604,7 @@
           <a:p>
             <a:fld id="{964302DC-9F53-934F-AE4D-0F1F197008C1}" type="datetimeFigureOut">
               <a:rPr lang="en-US" smtClean="0"/>
-              <a:t>2/2/24</a:t>
+              <a:t>2/9/24</a:t>
             </a:fld>
             <a:endParaRPr lang="en-US"/>
           </a:p>
@@ -774,7 +774,7 @@
           <a:p>
             <a:fld id="{964302DC-9F53-934F-AE4D-0F1F197008C1}" type="datetimeFigureOut">
               <a:rPr lang="en-US" smtClean="0"/>
-              <a:t>2/2/24</a:t>
+              <a:t>2/9/24</a:t>
             </a:fld>
             <a:endParaRPr lang="en-US"/>
           </a:p>
@@ -1018,7 +1018,7 @@
           <a:p>
             <a:fld id="{964302DC-9F53-934F-AE4D-0F1F197008C1}" type="datetimeFigureOut">
               <a:rPr lang="en-US" smtClean="0"/>
-              <a:t>2/2/24</a:t>
+              <a:t>2/9/24</a:t>
             </a:fld>
             <a:endParaRPr lang="en-US"/>
           </a:p>
@@ -1250,7 +1250,7 @@
           <a:p>
             <a:fld id="{964302DC-9F53-934F-AE4D-0F1F197008C1}" type="datetimeFigureOut">
               <a:rPr lang="en-US" smtClean="0"/>
-              <a:t>2/2/24</a:t>
+              <a:t>2/9/24</a:t>
             </a:fld>
             <a:endParaRPr lang="en-US"/>
           </a:p>
@@ -1617,7 +1617,7 @@
           <a:p>
             <a:fld id="{964302DC-9F53-934F-AE4D-0F1F197008C1}" type="datetimeFigureOut">
               <a:rPr lang="en-US" smtClean="0"/>
-              <a:t>2/2/24</a:t>
+              <a:t>2/9/24</a:t>
             </a:fld>
             <a:endParaRPr lang="en-US"/>
           </a:p>
@@ -1735,7 +1735,7 @@
           <a:p>
             <a:fld id="{964302DC-9F53-934F-AE4D-0F1F197008C1}" type="datetimeFigureOut">
               <a:rPr lang="en-US" smtClean="0"/>
-              <a:t>2/2/24</a:t>
+              <a:t>2/9/24</a:t>
             </a:fld>
             <a:endParaRPr lang="en-US"/>
           </a:p>
@@ -1830,7 +1830,7 @@
           <a:p>
             <a:fld id="{964302DC-9F53-934F-AE4D-0F1F197008C1}" type="datetimeFigureOut">
               <a:rPr lang="en-US" smtClean="0"/>
-              <a:t>2/2/24</a:t>
+              <a:t>2/9/24</a:t>
             </a:fld>
             <a:endParaRPr lang="en-US"/>
           </a:p>
@@ -2107,7 +2107,7 @@
           <a:p>
             <a:fld id="{964302DC-9F53-934F-AE4D-0F1F197008C1}" type="datetimeFigureOut">
               <a:rPr lang="en-US" smtClean="0"/>
-              <a:t>2/2/24</a:t>
+              <a:t>2/9/24</a:t>
             </a:fld>
             <a:endParaRPr lang="en-US"/>
           </a:p>
@@ -2364,7 +2364,7 @@
           <a:p>
             <a:fld id="{964302DC-9F53-934F-AE4D-0F1F197008C1}" type="datetimeFigureOut">
               <a:rPr lang="en-US" smtClean="0"/>
-              <a:t>2/2/24</a:t>
+              <a:t>2/9/24</a:t>
             </a:fld>
             <a:endParaRPr lang="en-US"/>
           </a:p>
@@ -2429,9 +2429,18 @@
 <p:sldMaster xmlns:a="http://schemas.openxmlformats.org/drawingml/2006/main" xmlns:r="http://schemas.openxmlformats.org/officeDocument/2006/relationships" xmlns:p="http://schemas.openxmlformats.org/presentationml/2006/main">
   <p:cSld>
     <p:bg>
-      <p:bgRef idx="1001">
-        <a:schemeClr val="bg1"/>
-      </p:bgRef>
+      <p:bgPr>
+        <a:blipFill dpi="0" rotWithShape="1">
+          <a:blip r:embed="rId13">
+            <a:lum/>
+          </a:blip>
+          <a:srcRect/>
+          <a:stretch>
+            <a:fillRect l="-4000" r="-4000"/>
+          </a:stretch>
+        </a:blipFill>
+        <a:effectLst/>
+      </p:bgPr>
     </p:bg>
     <p:spTree>
       <p:nvGrpSpPr>
@@ -2577,7 +2586,7 @@
           <a:p>
             <a:fld id="{964302DC-9F53-934F-AE4D-0F1F197008C1}" type="datetimeFigureOut">
               <a:rPr lang="en-US" smtClean="0"/>
-              <a:t>2/2/24</a:t>
+              <a:t>2/9/24</a:t>
             </a:fld>
             <a:endParaRPr lang="en-US"/>
           </a:p>
@@ -2968,20 +2977,6 @@
 <file path=ppt/slides/slide1.xml><?xml version="1.0" encoding="utf-8"?>
 <p:sld xmlns:a="http://schemas.openxmlformats.org/drawingml/2006/main" xmlns:r="http://schemas.openxmlformats.org/officeDocument/2006/relationships" xmlns:p="http://schemas.openxmlformats.org/presentationml/2006/main">
   <p:cSld>
-    <p:bg>
-      <p:bgPr>
-        <a:blipFill dpi="0" rotWithShape="1">
-          <a:blip r:embed="rId2">
-            <a:lum/>
-          </a:blip>
-          <a:srcRect/>
-          <a:stretch>
-            <a:fillRect l="-4000" r="-4000"/>
-          </a:stretch>
-        </a:blipFill>
-        <a:effectLst/>
-      </p:bgPr>
-    </p:bg>
     <p:spTree>
       <p:nvGrpSpPr>
         <p:cNvPr id="1" name=""/>
@@ -3031,7 +3026,7 @@
             <p:nvPr/>
           </p:nvPicPr>
           <p:blipFill>
-            <a:blip r:embed="rId3">
+            <a:blip r:embed="rId2">
               <a:alphaModFix amt="30000"/>
             </a:blip>
             <a:stretch>
@@ -5129,7 +5124,7 @@
           <p:nvPr/>
         </p:nvPicPr>
         <p:blipFill>
-          <a:blip r:embed="rId4">
+          <a:blip r:embed="rId3">
             <a:alphaModFix amt="30000"/>
           </a:blip>
           <a:stretch>
@@ -5341,7 +5336,7 @@
                   </a:schemeClr>
                 </a:solidFill>
               </a:rPr>
-              <a:t>  WriteLine("Good choice, C# is a fine language.");</a:t>
+              <a:t>    WriteLine("Good choice, C# is a fine language.");</a:t>
             </a:r>
           </a:p>
           <a:p>
@@ -5405,7 +5400,7 @@
                   </a:schemeClr>
                 </a:solidFill>
               </a:rPr>
-              <a:t>  WriteLine(“These are great languages.”);</a:t>
+              <a:t>    WriteLine(“These are great languages.”);</a:t>
             </a:r>
           </a:p>
           <a:p>
@@ -5438,272 +5433,6 @@
                 </a:solidFill>
               </a:rPr>
               <a:t>else …</a:t>
-            </a:r>
-          </a:p>
-        </p:txBody>
-      </p:sp>
-      <p:sp>
-        <p:nvSpPr>
-          <p:cNvPr id="22" name="Rectangle 21">
-            <a:extLst>
-              <a:ext uri="{FF2B5EF4-FFF2-40B4-BE49-F238E27FC236}">
-                <a16:creationId xmlns:a16="http://schemas.microsoft.com/office/drawing/2014/main" id="{DC4A663E-B37D-A3E4-8CFB-373399FD44A2}"/>
-              </a:ext>
-            </a:extLst>
-          </p:cNvPr>
-          <p:cNvSpPr/>
-          <p:nvPr/>
-        </p:nvSpPr>
-        <p:spPr>
-          <a:xfrm>
-            <a:off x="4994190" y="463922"/>
-            <a:ext cx="2127794" cy="1085065"/>
-          </a:xfrm>
-          <a:custGeom>
-            <a:avLst/>
-            <a:gdLst>
-              <a:gd name="connsiteX0" fmla="*/ 0 w 2127794"/>
-              <a:gd name="connsiteY0" fmla="*/ 0 h 1085065"/>
-              <a:gd name="connsiteX1" fmla="*/ 510671 w 2127794"/>
-              <a:gd name="connsiteY1" fmla="*/ 0 h 1085065"/>
-              <a:gd name="connsiteX2" fmla="*/ 1042619 w 2127794"/>
-              <a:gd name="connsiteY2" fmla="*/ 0 h 1085065"/>
-              <a:gd name="connsiteX3" fmla="*/ 1595846 w 2127794"/>
-              <a:gd name="connsiteY3" fmla="*/ 0 h 1085065"/>
-              <a:gd name="connsiteX4" fmla="*/ 2127794 w 2127794"/>
-              <a:gd name="connsiteY4" fmla="*/ 0 h 1085065"/>
-              <a:gd name="connsiteX5" fmla="*/ 2127794 w 2127794"/>
-              <a:gd name="connsiteY5" fmla="*/ 553383 h 1085065"/>
-              <a:gd name="connsiteX6" fmla="*/ 2127794 w 2127794"/>
-              <a:gd name="connsiteY6" fmla="*/ 1085065 h 1085065"/>
-              <a:gd name="connsiteX7" fmla="*/ 1553290 w 2127794"/>
-              <a:gd name="connsiteY7" fmla="*/ 1085065 h 1085065"/>
-              <a:gd name="connsiteX8" fmla="*/ 978785 w 2127794"/>
-              <a:gd name="connsiteY8" fmla="*/ 1085065 h 1085065"/>
-              <a:gd name="connsiteX9" fmla="*/ 0 w 2127794"/>
-              <a:gd name="connsiteY9" fmla="*/ 1085065 h 1085065"/>
-              <a:gd name="connsiteX10" fmla="*/ 0 w 2127794"/>
-              <a:gd name="connsiteY10" fmla="*/ 553383 h 1085065"/>
-              <a:gd name="connsiteX11" fmla="*/ 0 w 2127794"/>
-              <a:gd name="connsiteY11" fmla="*/ 0 h 1085065"/>
-            </a:gdLst>
-            <a:ahLst/>
-            <a:cxnLst>
-              <a:cxn ang="0">
-                <a:pos x="connsiteX0" y="connsiteY0"/>
-              </a:cxn>
-              <a:cxn ang="0">
-                <a:pos x="connsiteX1" y="connsiteY1"/>
-              </a:cxn>
-              <a:cxn ang="0">
-                <a:pos x="connsiteX2" y="connsiteY2"/>
-              </a:cxn>
-              <a:cxn ang="0">
-                <a:pos x="connsiteX3" y="connsiteY3"/>
-              </a:cxn>
-              <a:cxn ang="0">
-                <a:pos x="connsiteX4" y="connsiteY4"/>
-              </a:cxn>
-              <a:cxn ang="0">
-                <a:pos x="connsiteX5" y="connsiteY5"/>
-              </a:cxn>
-              <a:cxn ang="0">
-                <a:pos x="connsiteX6" y="connsiteY6"/>
-              </a:cxn>
-              <a:cxn ang="0">
-                <a:pos x="connsiteX7" y="connsiteY7"/>
-              </a:cxn>
-              <a:cxn ang="0">
-                <a:pos x="connsiteX8" y="connsiteY8"/>
-              </a:cxn>
-              <a:cxn ang="0">
-                <a:pos x="connsiteX9" y="connsiteY9"/>
-              </a:cxn>
-              <a:cxn ang="0">
-                <a:pos x="connsiteX10" y="connsiteY10"/>
-              </a:cxn>
-              <a:cxn ang="0">
-                <a:pos x="connsiteX11" y="connsiteY11"/>
-              </a:cxn>
-            </a:cxnLst>
-            <a:rect l="l" t="t" r="r" b="b"/>
-            <a:pathLst>
-              <a:path w="2127794" h="1085065" fill="none" extrusionOk="0">
-                <a:moveTo>
-                  <a:pt x="0" y="0"/>
-                </a:moveTo>
-                <a:cubicBezTo>
-                  <a:pt x="119302" y="-23815"/>
-                  <a:pt x="321953" y="-4268"/>
-                  <a:pt x="510671" y="0"/>
-                </a:cubicBezTo>
-                <a:cubicBezTo>
-                  <a:pt x="699389" y="4268"/>
-                  <a:pt x="838789" y="907"/>
-                  <a:pt x="1042619" y="0"/>
-                </a:cubicBezTo>
-                <a:cubicBezTo>
-                  <a:pt x="1246449" y="-907"/>
-                  <a:pt x="1411197" y="-21334"/>
-                  <a:pt x="1595846" y="0"/>
-                </a:cubicBezTo>
-                <a:cubicBezTo>
-                  <a:pt x="1780495" y="21334"/>
-                  <a:pt x="1932912" y="7920"/>
-                  <a:pt x="2127794" y="0"/>
-                </a:cubicBezTo>
-                <a:cubicBezTo>
-                  <a:pt x="2127419" y="271704"/>
-                  <a:pt x="2137857" y="397892"/>
-                  <a:pt x="2127794" y="553383"/>
-                </a:cubicBezTo>
-                <a:cubicBezTo>
-                  <a:pt x="2117731" y="708874"/>
-                  <a:pt x="2106279" y="956975"/>
-                  <a:pt x="2127794" y="1085065"/>
-                </a:cubicBezTo>
-                <a:cubicBezTo>
-                  <a:pt x="1885798" y="1101516"/>
-                  <a:pt x="1702327" y="1081558"/>
-                  <a:pt x="1553290" y="1085065"/>
-                </a:cubicBezTo>
-                <a:cubicBezTo>
-                  <a:pt x="1404253" y="1088572"/>
-                  <a:pt x="1242606" y="1094387"/>
-                  <a:pt x="978785" y="1085065"/>
-                </a:cubicBezTo>
-                <a:cubicBezTo>
-                  <a:pt x="714965" y="1075743"/>
-                  <a:pt x="280424" y="1084092"/>
-                  <a:pt x="0" y="1085065"/>
-                </a:cubicBezTo>
-                <a:cubicBezTo>
-                  <a:pt x="-13849" y="960040"/>
-                  <a:pt x="-19899" y="725067"/>
-                  <a:pt x="0" y="553383"/>
-                </a:cubicBezTo>
-                <a:cubicBezTo>
-                  <a:pt x="19899" y="381699"/>
-                  <a:pt x="-3693" y="272116"/>
-                  <a:pt x="0" y="0"/>
-                </a:cubicBezTo>
-                <a:close/>
-              </a:path>
-              <a:path w="2127794" h="1085065" stroke="0" extrusionOk="0">
-                <a:moveTo>
-                  <a:pt x="0" y="0"/>
-                </a:moveTo>
-                <a:cubicBezTo>
-                  <a:pt x="171248" y="-8495"/>
-                  <a:pt x="325453" y="21877"/>
-                  <a:pt x="510671" y="0"/>
-                </a:cubicBezTo>
-                <a:cubicBezTo>
-                  <a:pt x="695889" y="-21877"/>
-                  <a:pt x="809193" y="-10069"/>
-                  <a:pt x="978785" y="0"/>
-                </a:cubicBezTo>
-                <a:cubicBezTo>
-                  <a:pt x="1148377" y="10069"/>
-                  <a:pt x="1318885" y="9299"/>
-                  <a:pt x="1553290" y="0"/>
-                </a:cubicBezTo>
-                <a:cubicBezTo>
-                  <a:pt x="1787695" y="-9299"/>
-                  <a:pt x="2002069" y="-24687"/>
-                  <a:pt x="2127794" y="0"/>
-                </a:cubicBezTo>
-                <a:cubicBezTo>
-                  <a:pt x="2106314" y="169500"/>
-                  <a:pt x="2151272" y="285308"/>
-                  <a:pt x="2127794" y="531682"/>
-                </a:cubicBezTo>
-                <a:cubicBezTo>
-                  <a:pt x="2104316" y="778056"/>
-                  <a:pt x="2118402" y="967639"/>
-                  <a:pt x="2127794" y="1085065"/>
-                </a:cubicBezTo>
-                <a:cubicBezTo>
-                  <a:pt x="1964894" y="1061427"/>
-                  <a:pt x="1766987" y="1072900"/>
-                  <a:pt x="1595846" y="1085065"/>
-                </a:cubicBezTo>
-                <a:cubicBezTo>
-                  <a:pt x="1424705" y="1097230"/>
-                  <a:pt x="1145921" y="1082667"/>
-                  <a:pt x="1021341" y="1085065"/>
-                </a:cubicBezTo>
-                <a:cubicBezTo>
-                  <a:pt x="896762" y="1087463"/>
-                  <a:pt x="704333" y="1073542"/>
-                  <a:pt x="553226" y="1085065"/>
-                </a:cubicBezTo>
-                <a:cubicBezTo>
-                  <a:pt x="402120" y="1096588"/>
-                  <a:pt x="149634" y="1090117"/>
-                  <a:pt x="0" y="1085065"/>
-                </a:cubicBezTo>
-                <a:cubicBezTo>
-                  <a:pt x="21856" y="935562"/>
-                  <a:pt x="-26363" y="762075"/>
-                  <a:pt x="0" y="542533"/>
-                </a:cubicBezTo>
-                <a:cubicBezTo>
-                  <a:pt x="26363" y="322991"/>
-                  <a:pt x="24427" y="211558"/>
-                  <a:pt x="0" y="0"/>
-                </a:cubicBezTo>
-                <a:close/>
-              </a:path>
-            </a:pathLst>
-          </a:custGeom>
-          <a:solidFill>
-            <a:schemeClr val="accent4">
-              <a:lumMod val="60000"/>
-              <a:lumOff val="40000"/>
-            </a:schemeClr>
-          </a:solidFill>
-          <a:ln w="12700">
-            <a:solidFill>
-              <a:schemeClr val="tx1"/>
-            </a:solidFill>
-            <a:extLst>
-              <a:ext uri="{C807C97D-BFC1-408E-A445-0C87EB9F89A2}">
-                <ask:lineSketchStyleProps xmlns:ask="http://schemas.microsoft.com/office/drawing/2018/sketchyshapes" sd="1219033472">
-                  <a:prstGeom prst="rect">
-                    <a:avLst/>
-                  </a:prstGeom>
-                  <ask:type>
-                    <ask:lineSketchFreehand/>
-                  </ask:type>
-                </ask:lineSketchStyleProps>
-              </a:ext>
-            </a:extLst>
-          </a:ln>
-          <a:effectLst/>
-        </p:spPr>
-        <p:style>
-          <a:lnRef idx="1">
-            <a:schemeClr val="accent4"/>
-          </a:lnRef>
-          <a:fillRef idx="2">
-            <a:schemeClr val="accent4"/>
-          </a:fillRef>
-          <a:effectRef idx="1">
-            <a:schemeClr val="accent4"/>
-          </a:effectRef>
-          <a:fontRef idx="minor">
-            <a:schemeClr val="dk1"/>
-          </a:fontRef>
-        </p:style>
-        <p:txBody>
-          <a:bodyPr rtlCol="0" anchor="ctr"/>
-          <a:lstStyle/>
-          <a:p>
-            <a:pPr algn="ctr"/>
-            <a:r>
-              <a:rPr lang="en-US" sz="1600" dirty="0"/>
-              <a:t>Let's see what happens if the user inputs “C#”</a:t>
             </a:r>
           </a:p>
         </p:txBody>
@@ -8062,7 +7791,7 @@
                   </a:schemeClr>
                 </a:solidFill>
               </a:rPr>
-              <a:t>  WriteLine("Good choice, C# is a fine language.");</a:t>
+              <a:t>    WriteLine("Good choice, C# is a fine language.");</a:t>
             </a:r>
           </a:p>
           <a:p>
@@ -8126,7 +7855,7 @@
                   </a:schemeClr>
                 </a:solidFill>
               </a:rPr>
-              <a:t>  WriteLine(“These are great languages.”);</a:t>
+              <a:t>    WriteLine(“These are great languages.”);</a:t>
             </a:r>
           </a:p>
           <a:p>
@@ -10569,7 +10298,7 @@
                   </a:schemeClr>
                 </a:solidFill>
               </a:rPr>
-              <a:t>  WriteLine("Good choice, C# is a fine language.");</a:t>
+              <a:t>    WriteLine("Good choice, C# is a fine language.");</a:t>
             </a:r>
           </a:p>
           <a:p>
@@ -10637,7 +10366,7 @@
                   </a:schemeClr>
                 </a:solidFill>
               </a:rPr>
-              <a:t>  WriteLine(“These are great languages.”);</a:t>
+              <a:t>    WriteLine(“These are great languages.”);</a:t>
             </a:r>
           </a:p>
           <a:p>
@@ -10791,20 +10520,6 @@
 <file path=ppt/slides/slide12.xml><?xml version="1.0" encoding="utf-8"?>
 <p:sld xmlns:a="http://schemas.openxmlformats.org/drawingml/2006/main" xmlns:r="http://schemas.openxmlformats.org/officeDocument/2006/relationships" xmlns:p="http://schemas.openxmlformats.org/presentationml/2006/main">
   <p:cSld>
-    <p:bg>
-      <p:bgPr>
-        <a:blipFill dpi="0" rotWithShape="1">
-          <a:blip r:embed="rId2">
-            <a:lum/>
-          </a:blip>
-          <a:srcRect/>
-          <a:stretch>
-            <a:fillRect t="-49000" b="-49000"/>
-          </a:stretch>
-        </a:blipFill>
-        <a:effectLst/>
-      </p:bgPr>
-    </p:bg>
     <p:spTree>
       <p:nvGrpSpPr>
         <p:cNvPr id="1" name=""/>
@@ -10854,7 +10569,7 @@
             <p:nvPr/>
           </p:nvPicPr>
           <p:blipFill>
-            <a:blip r:embed="rId3">
+            <a:blip r:embed="rId2">
               <a:alphaModFix amt="30000"/>
             </a:blip>
             <a:stretch>
@@ -12952,7 +12667,7 @@
           <p:nvPr/>
         </p:nvPicPr>
         <p:blipFill>
-          <a:blip r:embed="rId4">
+          <a:blip r:embed="rId3">
             <a:alphaModFix amt="30000"/>
           </a:blip>
           <a:stretch>
@@ -13106,7 +12821,7 @@
                   </a:schemeClr>
                 </a:solidFill>
               </a:rPr>
-              <a:t>  WriteLine("Good choice, C# is a fine language.");</a:t>
+              <a:t>    WriteLine("Good choice, C# is a fine language.");</a:t>
             </a:r>
           </a:p>
           <a:p>
@@ -13170,7 +12885,7 @@
                   </a:schemeClr>
                 </a:solidFill>
               </a:rPr>
-              <a:t>  WriteLine(“These are great languages.”);</a:t>
+              <a:t>    WriteLine(“These are great languages.”);</a:t>
             </a:r>
           </a:p>
           <a:p>
@@ -13300,20 +13015,6 @@
 <file path=ppt/slides/slide2.xml><?xml version="1.0" encoding="utf-8"?>
 <p:sld xmlns:a="http://schemas.openxmlformats.org/drawingml/2006/main" xmlns:r="http://schemas.openxmlformats.org/officeDocument/2006/relationships" xmlns:p="http://schemas.openxmlformats.org/presentationml/2006/main">
   <p:cSld>
-    <p:bg>
-      <p:bgPr>
-        <a:blipFill dpi="0" rotWithShape="1">
-          <a:blip r:embed="rId2">
-            <a:lum/>
-          </a:blip>
-          <a:srcRect/>
-          <a:stretch>
-            <a:fillRect/>
-          </a:stretch>
-        </a:blipFill>
-        <a:effectLst/>
-      </p:bgPr>
-    </p:bg>
     <p:spTree>
       <p:nvGrpSpPr>
         <p:cNvPr id="1" name=""/>
@@ -13363,7 +13064,7 @@
             <p:nvPr/>
           </p:nvPicPr>
           <p:blipFill>
-            <a:blip r:embed="rId3">
+            <a:blip r:embed="rId2">
               <a:alphaModFix amt="30000"/>
             </a:blip>
             <a:stretch>
@@ -15461,7 +15162,7 @@
           <p:nvPr/>
         </p:nvPicPr>
         <p:blipFill>
-          <a:blip r:embed="rId4">
+          <a:blip r:embed="rId3">
             <a:alphaModFix amt="30000"/>
           </a:blip>
           <a:stretch>
@@ -15591,7 +15292,7 @@
             </a:pPr>
             <a:r>
               <a:rPr lang="en-US" sz="1600" dirty="0"/>
-              <a:t>  WriteLine("Good choice, C# is a fine language.");</a:t>
+              <a:t>    WriteLine("Good choice, C# is a fine language.");</a:t>
             </a:r>
           </a:p>
           <a:p>
@@ -15649,7 +15350,7 @@
                   </a:schemeClr>
                 </a:solidFill>
               </a:rPr>
-              <a:t>  WriteLine(“These are great languages.”);</a:t>
+              <a:t>    WriteLine(“These are great languages.”);</a:t>
             </a:r>
           </a:p>
           <a:p>
@@ -15803,20 +15504,6 @@
 <file path=ppt/slides/slide3.xml><?xml version="1.0" encoding="utf-8"?>
 <p:sld xmlns:a="http://schemas.openxmlformats.org/drawingml/2006/main" xmlns:r="http://schemas.openxmlformats.org/officeDocument/2006/relationships" xmlns:p="http://schemas.openxmlformats.org/presentationml/2006/main">
   <p:cSld>
-    <p:bg>
-      <p:bgPr>
-        <a:blipFill dpi="0" rotWithShape="1">
-          <a:blip r:embed="rId2">
-            <a:lum/>
-          </a:blip>
-          <a:srcRect/>
-          <a:stretch>
-            <a:fillRect/>
-          </a:stretch>
-        </a:blipFill>
-        <a:effectLst/>
-      </p:bgPr>
-    </p:bg>
     <p:spTree>
       <p:nvGrpSpPr>
         <p:cNvPr id="1" name=""/>
@@ -15866,7 +15553,7 @@
             <p:nvPr/>
           </p:nvPicPr>
           <p:blipFill>
-            <a:blip r:embed="rId3">
+            <a:blip r:embed="rId2">
               <a:alphaModFix amt="30000"/>
             </a:blip>
             <a:stretch>
@@ -17964,7 +17651,7 @@
           <p:nvPr/>
         </p:nvPicPr>
         <p:blipFill>
-          <a:blip r:embed="rId4">
+          <a:blip r:embed="rId3">
             <a:alphaModFix amt="30000"/>
           </a:blip>
           <a:stretch>
@@ -18124,7 +17811,7 @@
                   </a:schemeClr>
                 </a:solidFill>
               </a:rPr>
-              <a:t>  WriteLine("Good choice, C# is a fine language.");</a:t>
+              <a:t>    WriteLine("Good choice, C# is a fine language.");</a:t>
             </a:r>
           </a:p>
           <a:p>
@@ -18192,7 +17879,7 @@
                   </a:schemeClr>
                 </a:solidFill>
               </a:rPr>
-              <a:t>  WriteLine(“These are great languages.”);</a:t>
+              <a:t>    WriteLine(“These are great languages.”);</a:t>
             </a:r>
           </a:p>
           <a:p>
@@ -18340,20 +18027,6 @@
 <file path=ppt/slides/slide4.xml><?xml version="1.0" encoding="utf-8"?>
 <p:sld xmlns:a="http://schemas.openxmlformats.org/drawingml/2006/main" xmlns:r="http://schemas.openxmlformats.org/officeDocument/2006/relationships" xmlns:p="http://schemas.openxmlformats.org/presentationml/2006/main">
   <p:cSld>
-    <p:bg>
-      <p:bgPr>
-        <a:blipFill dpi="0" rotWithShape="1">
-          <a:blip r:embed="rId2">
-            <a:lum/>
-          </a:blip>
-          <a:srcRect/>
-          <a:stretch>
-            <a:fillRect/>
-          </a:stretch>
-        </a:blipFill>
-        <a:effectLst/>
-      </p:bgPr>
-    </p:bg>
     <p:spTree>
       <p:nvGrpSpPr>
         <p:cNvPr id="1" name=""/>
@@ -18403,7 +18076,7 @@
             <p:nvPr/>
           </p:nvPicPr>
           <p:blipFill>
-            <a:blip r:embed="rId3">
+            <a:blip r:embed="rId2">
               <a:alphaModFix amt="30000"/>
             </a:blip>
             <a:stretch>
@@ -20501,7 +20174,7 @@
           <p:nvPr/>
         </p:nvPicPr>
         <p:blipFill>
-          <a:blip r:embed="rId4">
+          <a:blip r:embed="rId3">
             <a:alphaModFix amt="30000"/>
           </a:blip>
           <a:stretch>
@@ -20713,7 +20386,7 @@
                   </a:schemeClr>
                 </a:solidFill>
               </a:rPr>
-              <a:t>  WriteLine("Good choice, C# is a fine language.");</a:t>
+              <a:t>    WriteLine("Good choice, C# is a fine language.");</a:t>
             </a:r>
           </a:p>
           <a:p>
@@ -20777,7 +20450,7 @@
                   </a:schemeClr>
                 </a:solidFill>
               </a:rPr>
-              <a:t>  WriteLine(“These are great languages.”);</a:t>
+              <a:t>    WriteLine(“These are great languages.”);</a:t>
             </a:r>
           </a:p>
           <a:p>
@@ -20810,272 +20483,6 @@
                 </a:solidFill>
               </a:rPr>
               <a:t>else …</a:t>
-            </a:r>
-          </a:p>
-        </p:txBody>
-      </p:sp>
-      <p:sp>
-        <p:nvSpPr>
-          <p:cNvPr id="22" name="Rectangle 21">
-            <a:extLst>
-              <a:ext uri="{FF2B5EF4-FFF2-40B4-BE49-F238E27FC236}">
-                <a16:creationId xmlns:a16="http://schemas.microsoft.com/office/drawing/2014/main" id="{DC4A663E-B37D-A3E4-8CFB-373399FD44A2}"/>
-              </a:ext>
-            </a:extLst>
-          </p:cNvPr>
-          <p:cNvSpPr/>
-          <p:nvPr/>
-        </p:nvSpPr>
-        <p:spPr>
-          <a:xfrm>
-            <a:off x="4994190" y="463922"/>
-            <a:ext cx="2127794" cy="1085065"/>
-          </a:xfrm>
-          <a:custGeom>
-            <a:avLst/>
-            <a:gdLst>
-              <a:gd name="connsiteX0" fmla="*/ 0 w 2127794"/>
-              <a:gd name="connsiteY0" fmla="*/ 0 h 1085065"/>
-              <a:gd name="connsiteX1" fmla="*/ 510671 w 2127794"/>
-              <a:gd name="connsiteY1" fmla="*/ 0 h 1085065"/>
-              <a:gd name="connsiteX2" fmla="*/ 1042619 w 2127794"/>
-              <a:gd name="connsiteY2" fmla="*/ 0 h 1085065"/>
-              <a:gd name="connsiteX3" fmla="*/ 1595846 w 2127794"/>
-              <a:gd name="connsiteY3" fmla="*/ 0 h 1085065"/>
-              <a:gd name="connsiteX4" fmla="*/ 2127794 w 2127794"/>
-              <a:gd name="connsiteY4" fmla="*/ 0 h 1085065"/>
-              <a:gd name="connsiteX5" fmla="*/ 2127794 w 2127794"/>
-              <a:gd name="connsiteY5" fmla="*/ 553383 h 1085065"/>
-              <a:gd name="connsiteX6" fmla="*/ 2127794 w 2127794"/>
-              <a:gd name="connsiteY6" fmla="*/ 1085065 h 1085065"/>
-              <a:gd name="connsiteX7" fmla="*/ 1553290 w 2127794"/>
-              <a:gd name="connsiteY7" fmla="*/ 1085065 h 1085065"/>
-              <a:gd name="connsiteX8" fmla="*/ 978785 w 2127794"/>
-              <a:gd name="connsiteY8" fmla="*/ 1085065 h 1085065"/>
-              <a:gd name="connsiteX9" fmla="*/ 0 w 2127794"/>
-              <a:gd name="connsiteY9" fmla="*/ 1085065 h 1085065"/>
-              <a:gd name="connsiteX10" fmla="*/ 0 w 2127794"/>
-              <a:gd name="connsiteY10" fmla="*/ 553383 h 1085065"/>
-              <a:gd name="connsiteX11" fmla="*/ 0 w 2127794"/>
-              <a:gd name="connsiteY11" fmla="*/ 0 h 1085065"/>
-            </a:gdLst>
-            <a:ahLst/>
-            <a:cxnLst>
-              <a:cxn ang="0">
-                <a:pos x="connsiteX0" y="connsiteY0"/>
-              </a:cxn>
-              <a:cxn ang="0">
-                <a:pos x="connsiteX1" y="connsiteY1"/>
-              </a:cxn>
-              <a:cxn ang="0">
-                <a:pos x="connsiteX2" y="connsiteY2"/>
-              </a:cxn>
-              <a:cxn ang="0">
-                <a:pos x="connsiteX3" y="connsiteY3"/>
-              </a:cxn>
-              <a:cxn ang="0">
-                <a:pos x="connsiteX4" y="connsiteY4"/>
-              </a:cxn>
-              <a:cxn ang="0">
-                <a:pos x="connsiteX5" y="connsiteY5"/>
-              </a:cxn>
-              <a:cxn ang="0">
-                <a:pos x="connsiteX6" y="connsiteY6"/>
-              </a:cxn>
-              <a:cxn ang="0">
-                <a:pos x="connsiteX7" y="connsiteY7"/>
-              </a:cxn>
-              <a:cxn ang="0">
-                <a:pos x="connsiteX8" y="connsiteY8"/>
-              </a:cxn>
-              <a:cxn ang="0">
-                <a:pos x="connsiteX9" y="connsiteY9"/>
-              </a:cxn>
-              <a:cxn ang="0">
-                <a:pos x="connsiteX10" y="connsiteY10"/>
-              </a:cxn>
-              <a:cxn ang="0">
-                <a:pos x="connsiteX11" y="connsiteY11"/>
-              </a:cxn>
-            </a:cxnLst>
-            <a:rect l="l" t="t" r="r" b="b"/>
-            <a:pathLst>
-              <a:path w="2127794" h="1085065" fill="none" extrusionOk="0">
-                <a:moveTo>
-                  <a:pt x="0" y="0"/>
-                </a:moveTo>
-                <a:cubicBezTo>
-                  <a:pt x="119302" y="-23815"/>
-                  <a:pt x="321953" y="-4268"/>
-                  <a:pt x="510671" y="0"/>
-                </a:cubicBezTo>
-                <a:cubicBezTo>
-                  <a:pt x="699389" y="4268"/>
-                  <a:pt x="838789" y="907"/>
-                  <a:pt x="1042619" y="0"/>
-                </a:cubicBezTo>
-                <a:cubicBezTo>
-                  <a:pt x="1246449" y="-907"/>
-                  <a:pt x="1411197" y="-21334"/>
-                  <a:pt x="1595846" y="0"/>
-                </a:cubicBezTo>
-                <a:cubicBezTo>
-                  <a:pt x="1780495" y="21334"/>
-                  <a:pt x="1932912" y="7920"/>
-                  <a:pt x="2127794" y="0"/>
-                </a:cubicBezTo>
-                <a:cubicBezTo>
-                  <a:pt x="2127419" y="271704"/>
-                  <a:pt x="2137857" y="397892"/>
-                  <a:pt x="2127794" y="553383"/>
-                </a:cubicBezTo>
-                <a:cubicBezTo>
-                  <a:pt x="2117731" y="708874"/>
-                  <a:pt x="2106279" y="956975"/>
-                  <a:pt x="2127794" y="1085065"/>
-                </a:cubicBezTo>
-                <a:cubicBezTo>
-                  <a:pt x="1885798" y="1101516"/>
-                  <a:pt x="1702327" y="1081558"/>
-                  <a:pt x="1553290" y="1085065"/>
-                </a:cubicBezTo>
-                <a:cubicBezTo>
-                  <a:pt x="1404253" y="1088572"/>
-                  <a:pt x="1242606" y="1094387"/>
-                  <a:pt x="978785" y="1085065"/>
-                </a:cubicBezTo>
-                <a:cubicBezTo>
-                  <a:pt x="714965" y="1075743"/>
-                  <a:pt x="280424" y="1084092"/>
-                  <a:pt x="0" y="1085065"/>
-                </a:cubicBezTo>
-                <a:cubicBezTo>
-                  <a:pt x="-13849" y="960040"/>
-                  <a:pt x="-19899" y="725067"/>
-                  <a:pt x="0" y="553383"/>
-                </a:cubicBezTo>
-                <a:cubicBezTo>
-                  <a:pt x="19899" y="381699"/>
-                  <a:pt x="-3693" y="272116"/>
-                  <a:pt x="0" y="0"/>
-                </a:cubicBezTo>
-                <a:close/>
-              </a:path>
-              <a:path w="2127794" h="1085065" stroke="0" extrusionOk="0">
-                <a:moveTo>
-                  <a:pt x="0" y="0"/>
-                </a:moveTo>
-                <a:cubicBezTo>
-                  <a:pt x="171248" y="-8495"/>
-                  <a:pt x="325453" y="21877"/>
-                  <a:pt x="510671" y="0"/>
-                </a:cubicBezTo>
-                <a:cubicBezTo>
-                  <a:pt x="695889" y="-21877"/>
-                  <a:pt x="809193" y="-10069"/>
-                  <a:pt x="978785" y="0"/>
-                </a:cubicBezTo>
-                <a:cubicBezTo>
-                  <a:pt x="1148377" y="10069"/>
-                  <a:pt x="1318885" y="9299"/>
-                  <a:pt x="1553290" y="0"/>
-                </a:cubicBezTo>
-                <a:cubicBezTo>
-                  <a:pt x="1787695" y="-9299"/>
-                  <a:pt x="2002069" y="-24687"/>
-                  <a:pt x="2127794" y="0"/>
-                </a:cubicBezTo>
-                <a:cubicBezTo>
-                  <a:pt x="2106314" y="169500"/>
-                  <a:pt x="2151272" y="285308"/>
-                  <a:pt x="2127794" y="531682"/>
-                </a:cubicBezTo>
-                <a:cubicBezTo>
-                  <a:pt x="2104316" y="778056"/>
-                  <a:pt x="2118402" y="967639"/>
-                  <a:pt x="2127794" y="1085065"/>
-                </a:cubicBezTo>
-                <a:cubicBezTo>
-                  <a:pt x="1964894" y="1061427"/>
-                  <a:pt x="1766987" y="1072900"/>
-                  <a:pt x="1595846" y="1085065"/>
-                </a:cubicBezTo>
-                <a:cubicBezTo>
-                  <a:pt x="1424705" y="1097230"/>
-                  <a:pt x="1145921" y="1082667"/>
-                  <a:pt x="1021341" y="1085065"/>
-                </a:cubicBezTo>
-                <a:cubicBezTo>
-                  <a:pt x="896762" y="1087463"/>
-                  <a:pt x="704333" y="1073542"/>
-                  <a:pt x="553226" y="1085065"/>
-                </a:cubicBezTo>
-                <a:cubicBezTo>
-                  <a:pt x="402120" y="1096588"/>
-                  <a:pt x="149634" y="1090117"/>
-                  <a:pt x="0" y="1085065"/>
-                </a:cubicBezTo>
-                <a:cubicBezTo>
-                  <a:pt x="21856" y="935562"/>
-                  <a:pt x="-26363" y="762075"/>
-                  <a:pt x="0" y="542533"/>
-                </a:cubicBezTo>
-                <a:cubicBezTo>
-                  <a:pt x="26363" y="322991"/>
-                  <a:pt x="24427" y="211558"/>
-                  <a:pt x="0" y="0"/>
-                </a:cubicBezTo>
-                <a:close/>
-              </a:path>
-            </a:pathLst>
-          </a:custGeom>
-          <a:solidFill>
-            <a:schemeClr val="accent4">
-              <a:lumMod val="60000"/>
-              <a:lumOff val="40000"/>
-            </a:schemeClr>
-          </a:solidFill>
-          <a:ln w="12700">
-            <a:solidFill>
-              <a:schemeClr val="tx1"/>
-            </a:solidFill>
-            <a:extLst>
-              <a:ext uri="{C807C97D-BFC1-408E-A445-0C87EB9F89A2}">
-                <ask:lineSketchStyleProps xmlns:ask="http://schemas.microsoft.com/office/drawing/2018/sketchyshapes" sd="1219033472">
-                  <a:prstGeom prst="rect">
-                    <a:avLst/>
-                  </a:prstGeom>
-                  <ask:type>
-                    <ask:lineSketchFreehand/>
-                  </ask:type>
-                </ask:lineSketchStyleProps>
-              </a:ext>
-            </a:extLst>
-          </a:ln>
-          <a:effectLst/>
-        </p:spPr>
-        <p:style>
-          <a:lnRef idx="1">
-            <a:schemeClr val="accent4"/>
-          </a:lnRef>
-          <a:fillRef idx="2">
-            <a:schemeClr val="accent4"/>
-          </a:fillRef>
-          <a:effectRef idx="1">
-            <a:schemeClr val="accent4"/>
-          </a:effectRef>
-          <a:fontRef idx="minor">
-            <a:schemeClr val="dk1"/>
-          </a:fontRef>
-        </p:style>
-        <p:txBody>
-          <a:bodyPr rtlCol="0" anchor="ctr"/>
-          <a:lstStyle/>
-          <a:p>
-            <a:pPr algn="ctr"/>
-            <a:r>
-              <a:rPr lang="en-US" sz="1600" dirty="0"/>
-              <a:t>Let's see what happens if the user inputs “C++”</a:t>
             </a:r>
           </a:p>
         </p:txBody>
@@ -21133,20 +20540,6 @@
 <file path=ppt/slides/slide5.xml><?xml version="1.0" encoding="utf-8"?>
 <p:sld xmlns:a="http://schemas.openxmlformats.org/drawingml/2006/main" xmlns:r="http://schemas.openxmlformats.org/officeDocument/2006/relationships" xmlns:p="http://schemas.openxmlformats.org/presentationml/2006/main">
   <p:cSld>
-    <p:bg>
-      <p:bgPr>
-        <a:blipFill dpi="0" rotWithShape="1">
-          <a:blip r:embed="rId2">
-            <a:lum/>
-          </a:blip>
-          <a:srcRect/>
-          <a:stretch>
-            <a:fillRect/>
-          </a:stretch>
-        </a:blipFill>
-        <a:effectLst/>
-      </p:bgPr>
-    </p:bg>
     <p:spTree>
       <p:nvGrpSpPr>
         <p:cNvPr id="1" name=""/>
@@ -21196,7 +20589,7 @@
             <p:nvPr/>
           </p:nvPicPr>
           <p:blipFill>
-            <a:blip r:embed="rId3">
+            <a:blip r:embed="rId2">
               <a:alphaModFix amt="30000"/>
             </a:blip>
             <a:stretch>
@@ -23294,7 +22687,7 @@
           <p:nvPr/>
         </p:nvPicPr>
         <p:blipFill>
-          <a:blip r:embed="rId4">
+          <a:blip r:embed="rId3">
             <a:alphaModFix amt="30000"/>
           </a:blip>
           <a:stretch>
@@ -23430,7 +22823,7 @@
                   </a:schemeClr>
                 </a:solidFill>
               </a:rPr>
-              <a:t>  WriteLine("Good choice, C# is a fine language.");</a:t>
+              <a:t>    WriteLine("Good choice, C# is a fine language.");</a:t>
             </a:r>
           </a:p>
           <a:p>
@@ -23494,7 +22887,7 @@
                   </a:schemeClr>
                 </a:solidFill>
               </a:rPr>
-              <a:t>  WriteLine(“These are great languages.”);</a:t>
+              <a:t>    WriteLine(“These are great languages.”);</a:t>
             </a:r>
           </a:p>
           <a:p>
@@ -23648,20 +23041,6 @@
 <file path=ppt/slides/slide6.xml><?xml version="1.0" encoding="utf-8"?>
 <p:sld xmlns:a="http://schemas.openxmlformats.org/drawingml/2006/main" xmlns:r="http://schemas.openxmlformats.org/officeDocument/2006/relationships" xmlns:p="http://schemas.openxmlformats.org/presentationml/2006/main">
   <p:cSld>
-    <p:bg>
-      <p:bgPr>
-        <a:blipFill dpi="0" rotWithShape="1">
-          <a:blip r:embed="rId2">
-            <a:lum/>
-          </a:blip>
-          <a:srcRect/>
-          <a:stretch>
-            <a:fillRect/>
-          </a:stretch>
-        </a:blipFill>
-        <a:effectLst/>
-      </p:bgPr>
-    </p:bg>
     <p:spTree>
       <p:nvGrpSpPr>
         <p:cNvPr id="1" name=""/>
@@ -23711,7 +23090,7 @@
             <p:nvPr/>
           </p:nvPicPr>
           <p:blipFill>
-            <a:blip r:embed="rId3">
+            <a:blip r:embed="rId2">
               <a:alphaModFix amt="30000"/>
             </a:blip>
             <a:stretch>
@@ -25809,7 +25188,7 @@
           <p:nvPr/>
         </p:nvPicPr>
         <p:blipFill>
-          <a:blip r:embed="rId4">
+          <a:blip r:embed="rId3">
             <a:alphaModFix amt="30000"/>
           </a:blip>
           <a:stretch>
@@ -25951,7 +25330,7 @@
                   </a:schemeClr>
                 </a:solidFill>
               </a:rPr>
-              <a:t>  WriteLine("Good choice, C# is a fine language.");</a:t>
+              <a:t>    WriteLine("Good choice, C# is a fine language.");</a:t>
             </a:r>
           </a:p>
           <a:p>
@@ -26019,7 +25398,7 @@
                   </a:schemeClr>
                 </a:solidFill>
               </a:rPr>
-              <a:t>  WriteLine(“These are great languages.”);</a:t>
+              <a:t>    WriteLine(“These are great languages.”);</a:t>
             </a:r>
           </a:p>
           <a:p>
@@ -26173,20 +25552,6 @@
 <file path=ppt/slides/slide7.xml><?xml version="1.0" encoding="utf-8"?>
 <p:sld xmlns:a="http://schemas.openxmlformats.org/drawingml/2006/main" xmlns:r="http://schemas.openxmlformats.org/officeDocument/2006/relationships" xmlns:p="http://schemas.openxmlformats.org/presentationml/2006/main">
   <p:cSld>
-    <p:bg>
-      <p:bgPr>
-        <a:blipFill dpi="0" rotWithShape="1">
-          <a:blip r:embed="rId2">
-            <a:lum/>
-          </a:blip>
-          <a:srcRect/>
-          <a:stretch>
-            <a:fillRect/>
-          </a:stretch>
-        </a:blipFill>
-        <a:effectLst/>
-      </p:bgPr>
-    </p:bg>
     <p:spTree>
       <p:nvGrpSpPr>
         <p:cNvPr id="1" name=""/>
@@ -26236,7 +25601,7 @@
             <p:nvPr/>
           </p:nvPicPr>
           <p:blipFill>
-            <a:blip r:embed="rId3">
+            <a:blip r:embed="rId2">
               <a:alphaModFix amt="30000"/>
             </a:blip>
             <a:stretch>
@@ -28334,7 +27699,7 @@
           <p:nvPr/>
         </p:nvPicPr>
         <p:blipFill>
-          <a:blip r:embed="rId4">
+          <a:blip r:embed="rId3">
             <a:alphaModFix amt="30000"/>
           </a:blip>
           <a:stretch>
@@ -28483,7 +27848,7 @@
                   </a:schemeClr>
                 </a:solidFill>
               </a:rPr>
-              <a:t>  WriteLine("Good choice, C# is a fine language.");</a:t>
+              <a:t>    WriteLine("Good choice, C# is a fine language.");</a:t>
             </a:r>
           </a:p>
           <a:p>
@@ -28535,7 +27900,7 @@
             </a:pPr>
             <a:r>
               <a:rPr lang="en-US" sz="1600" dirty="0"/>
-              <a:t>  WriteLine(“These are great languages.”);</a:t>
+              <a:t>    WriteLine(“These are great languages.”);</a:t>
             </a:r>
           </a:p>
           <a:p>
@@ -28683,20 +28048,6 @@
 <file path=ppt/slides/slide8.xml><?xml version="1.0" encoding="utf-8"?>
 <p:sld xmlns:a="http://schemas.openxmlformats.org/drawingml/2006/main" xmlns:r="http://schemas.openxmlformats.org/officeDocument/2006/relationships" xmlns:p="http://schemas.openxmlformats.org/presentationml/2006/main">
   <p:cSld>
-    <p:bg>
-      <p:bgPr>
-        <a:blipFill dpi="0" rotWithShape="1">
-          <a:blip r:embed="rId2">
-            <a:lum/>
-          </a:blip>
-          <a:srcRect/>
-          <a:stretch>
-            <a:fillRect/>
-          </a:stretch>
-        </a:blipFill>
-        <a:effectLst/>
-      </p:bgPr>
-    </p:bg>
     <p:spTree>
       <p:nvGrpSpPr>
         <p:cNvPr id="1" name=""/>
@@ -28746,7 +28097,7 @@
             <p:nvPr/>
           </p:nvPicPr>
           <p:blipFill>
-            <a:blip r:embed="rId3">
+            <a:blip r:embed="rId2">
               <a:alphaModFix amt="30000"/>
             </a:blip>
             <a:stretch>
@@ -30844,7 +30195,7 @@
           <p:nvPr/>
         </p:nvPicPr>
         <p:blipFill>
-          <a:blip r:embed="rId4">
+          <a:blip r:embed="rId3">
             <a:alphaModFix amt="30000"/>
           </a:blip>
           <a:stretch>
@@ -31005,7 +30356,7 @@
                   </a:schemeClr>
                 </a:solidFill>
               </a:rPr>
-              <a:t>  WriteLine("Good choice, C# is a fine language.");</a:t>
+              <a:t>    WriteLine("Good choice, C# is a fine language.");</a:t>
             </a:r>
           </a:p>
           <a:p>
@@ -31069,7 +30420,7 @@
                   </a:schemeClr>
                 </a:solidFill>
               </a:rPr>
-              <a:t>  WriteLine(“These are great languages.”);</a:t>
+              <a:t>    WriteLine(“These are great languages.”);</a:t>
             </a:r>
           </a:p>
           <a:p>
@@ -33570,7 +32921,7 @@
                   </a:schemeClr>
                 </a:solidFill>
               </a:rPr>
-              <a:t>  WriteLine("Good choice, C# is a fine language.");</a:t>
+              <a:t>    WriteLine("Good choice, C# is a fine language.");</a:t>
             </a:r>
           </a:p>
           <a:p>
@@ -33634,7 +32985,7 @@
                   </a:schemeClr>
                 </a:solidFill>
               </a:rPr>
-              <a:t>  WriteLine(“These are great languages.”);</a:t>
+              <a:t>    WriteLine(“These are great languages.”);</a:t>
             </a:r>
           </a:p>
           <a:p>
@@ -33667,272 +33018,6 @@
                 </a:solidFill>
               </a:rPr>
               <a:t>else …</a:t>
-            </a:r>
-          </a:p>
-        </p:txBody>
-      </p:sp>
-      <p:sp>
-        <p:nvSpPr>
-          <p:cNvPr id="22" name="Rectangle 21">
-            <a:extLst>
-              <a:ext uri="{FF2B5EF4-FFF2-40B4-BE49-F238E27FC236}">
-                <a16:creationId xmlns:a16="http://schemas.microsoft.com/office/drawing/2014/main" id="{DC4A663E-B37D-A3E4-8CFB-373399FD44A2}"/>
-              </a:ext>
-            </a:extLst>
-          </p:cNvPr>
-          <p:cNvSpPr/>
-          <p:nvPr/>
-        </p:nvSpPr>
-        <p:spPr>
-          <a:xfrm>
-            <a:off x="4994190" y="463922"/>
-            <a:ext cx="2127794" cy="1085065"/>
-          </a:xfrm>
-          <a:custGeom>
-            <a:avLst/>
-            <a:gdLst>
-              <a:gd name="connsiteX0" fmla="*/ 0 w 2127794"/>
-              <a:gd name="connsiteY0" fmla="*/ 0 h 1085065"/>
-              <a:gd name="connsiteX1" fmla="*/ 510671 w 2127794"/>
-              <a:gd name="connsiteY1" fmla="*/ 0 h 1085065"/>
-              <a:gd name="connsiteX2" fmla="*/ 1042619 w 2127794"/>
-              <a:gd name="connsiteY2" fmla="*/ 0 h 1085065"/>
-              <a:gd name="connsiteX3" fmla="*/ 1595846 w 2127794"/>
-              <a:gd name="connsiteY3" fmla="*/ 0 h 1085065"/>
-              <a:gd name="connsiteX4" fmla="*/ 2127794 w 2127794"/>
-              <a:gd name="connsiteY4" fmla="*/ 0 h 1085065"/>
-              <a:gd name="connsiteX5" fmla="*/ 2127794 w 2127794"/>
-              <a:gd name="connsiteY5" fmla="*/ 553383 h 1085065"/>
-              <a:gd name="connsiteX6" fmla="*/ 2127794 w 2127794"/>
-              <a:gd name="connsiteY6" fmla="*/ 1085065 h 1085065"/>
-              <a:gd name="connsiteX7" fmla="*/ 1553290 w 2127794"/>
-              <a:gd name="connsiteY7" fmla="*/ 1085065 h 1085065"/>
-              <a:gd name="connsiteX8" fmla="*/ 978785 w 2127794"/>
-              <a:gd name="connsiteY8" fmla="*/ 1085065 h 1085065"/>
-              <a:gd name="connsiteX9" fmla="*/ 0 w 2127794"/>
-              <a:gd name="connsiteY9" fmla="*/ 1085065 h 1085065"/>
-              <a:gd name="connsiteX10" fmla="*/ 0 w 2127794"/>
-              <a:gd name="connsiteY10" fmla="*/ 553383 h 1085065"/>
-              <a:gd name="connsiteX11" fmla="*/ 0 w 2127794"/>
-              <a:gd name="connsiteY11" fmla="*/ 0 h 1085065"/>
-            </a:gdLst>
-            <a:ahLst/>
-            <a:cxnLst>
-              <a:cxn ang="0">
-                <a:pos x="connsiteX0" y="connsiteY0"/>
-              </a:cxn>
-              <a:cxn ang="0">
-                <a:pos x="connsiteX1" y="connsiteY1"/>
-              </a:cxn>
-              <a:cxn ang="0">
-                <a:pos x="connsiteX2" y="connsiteY2"/>
-              </a:cxn>
-              <a:cxn ang="0">
-                <a:pos x="connsiteX3" y="connsiteY3"/>
-              </a:cxn>
-              <a:cxn ang="0">
-                <a:pos x="connsiteX4" y="connsiteY4"/>
-              </a:cxn>
-              <a:cxn ang="0">
-                <a:pos x="connsiteX5" y="connsiteY5"/>
-              </a:cxn>
-              <a:cxn ang="0">
-                <a:pos x="connsiteX6" y="connsiteY6"/>
-              </a:cxn>
-              <a:cxn ang="0">
-                <a:pos x="connsiteX7" y="connsiteY7"/>
-              </a:cxn>
-              <a:cxn ang="0">
-                <a:pos x="connsiteX8" y="connsiteY8"/>
-              </a:cxn>
-              <a:cxn ang="0">
-                <a:pos x="connsiteX9" y="connsiteY9"/>
-              </a:cxn>
-              <a:cxn ang="0">
-                <a:pos x="connsiteX10" y="connsiteY10"/>
-              </a:cxn>
-              <a:cxn ang="0">
-                <a:pos x="connsiteX11" y="connsiteY11"/>
-              </a:cxn>
-            </a:cxnLst>
-            <a:rect l="l" t="t" r="r" b="b"/>
-            <a:pathLst>
-              <a:path w="2127794" h="1085065" fill="none" extrusionOk="0">
-                <a:moveTo>
-                  <a:pt x="0" y="0"/>
-                </a:moveTo>
-                <a:cubicBezTo>
-                  <a:pt x="119302" y="-23815"/>
-                  <a:pt x="321953" y="-4268"/>
-                  <a:pt x="510671" y="0"/>
-                </a:cubicBezTo>
-                <a:cubicBezTo>
-                  <a:pt x="699389" y="4268"/>
-                  <a:pt x="838789" y="907"/>
-                  <a:pt x="1042619" y="0"/>
-                </a:cubicBezTo>
-                <a:cubicBezTo>
-                  <a:pt x="1246449" y="-907"/>
-                  <a:pt x="1411197" y="-21334"/>
-                  <a:pt x="1595846" y="0"/>
-                </a:cubicBezTo>
-                <a:cubicBezTo>
-                  <a:pt x="1780495" y="21334"/>
-                  <a:pt x="1932912" y="7920"/>
-                  <a:pt x="2127794" y="0"/>
-                </a:cubicBezTo>
-                <a:cubicBezTo>
-                  <a:pt x="2127419" y="271704"/>
-                  <a:pt x="2137857" y="397892"/>
-                  <a:pt x="2127794" y="553383"/>
-                </a:cubicBezTo>
-                <a:cubicBezTo>
-                  <a:pt x="2117731" y="708874"/>
-                  <a:pt x="2106279" y="956975"/>
-                  <a:pt x="2127794" y="1085065"/>
-                </a:cubicBezTo>
-                <a:cubicBezTo>
-                  <a:pt x="1885798" y="1101516"/>
-                  <a:pt x="1702327" y="1081558"/>
-                  <a:pt x="1553290" y="1085065"/>
-                </a:cubicBezTo>
-                <a:cubicBezTo>
-                  <a:pt x="1404253" y="1088572"/>
-                  <a:pt x="1242606" y="1094387"/>
-                  <a:pt x="978785" y="1085065"/>
-                </a:cubicBezTo>
-                <a:cubicBezTo>
-                  <a:pt x="714965" y="1075743"/>
-                  <a:pt x="280424" y="1084092"/>
-                  <a:pt x="0" y="1085065"/>
-                </a:cubicBezTo>
-                <a:cubicBezTo>
-                  <a:pt x="-13849" y="960040"/>
-                  <a:pt x="-19899" y="725067"/>
-                  <a:pt x="0" y="553383"/>
-                </a:cubicBezTo>
-                <a:cubicBezTo>
-                  <a:pt x="19899" y="381699"/>
-                  <a:pt x="-3693" y="272116"/>
-                  <a:pt x="0" y="0"/>
-                </a:cubicBezTo>
-                <a:close/>
-              </a:path>
-              <a:path w="2127794" h="1085065" stroke="0" extrusionOk="0">
-                <a:moveTo>
-                  <a:pt x="0" y="0"/>
-                </a:moveTo>
-                <a:cubicBezTo>
-                  <a:pt x="171248" y="-8495"/>
-                  <a:pt x="325453" y="21877"/>
-                  <a:pt x="510671" y="0"/>
-                </a:cubicBezTo>
-                <a:cubicBezTo>
-                  <a:pt x="695889" y="-21877"/>
-                  <a:pt x="809193" y="-10069"/>
-                  <a:pt x="978785" y="0"/>
-                </a:cubicBezTo>
-                <a:cubicBezTo>
-                  <a:pt x="1148377" y="10069"/>
-                  <a:pt x="1318885" y="9299"/>
-                  <a:pt x="1553290" y="0"/>
-                </a:cubicBezTo>
-                <a:cubicBezTo>
-                  <a:pt x="1787695" y="-9299"/>
-                  <a:pt x="2002069" y="-24687"/>
-                  <a:pt x="2127794" y="0"/>
-                </a:cubicBezTo>
-                <a:cubicBezTo>
-                  <a:pt x="2106314" y="169500"/>
-                  <a:pt x="2151272" y="285308"/>
-                  <a:pt x="2127794" y="531682"/>
-                </a:cubicBezTo>
-                <a:cubicBezTo>
-                  <a:pt x="2104316" y="778056"/>
-                  <a:pt x="2118402" y="967639"/>
-                  <a:pt x="2127794" y="1085065"/>
-                </a:cubicBezTo>
-                <a:cubicBezTo>
-                  <a:pt x="1964894" y="1061427"/>
-                  <a:pt x="1766987" y="1072900"/>
-                  <a:pt x="1595846" y="1085065"/>
-                </a:cubicBezTo>
-                <a:cubicBezTo>
-                  <a:pt x="1424705" y="1097230"/>
-                  <a:pt x="1145921" y="1082667"/>
-                  <a:pt x="1021341" y="1085065"/>
-                </a:cubicBezTo>
-                <a:cubicBezTo>
-                  <a:pt x="896762" y="1087463"/>
-                  <a:pt x="704333" y="1073542"/>
-                  <a:pt x="553226" y="1085065"/>
-                </a:cubicBezTo>
-                <a:cubicBezTo>
-                  <a:pt x="402120" y="1096588"/>
-                  <a:pt x="149634" y="1090117"/>
-                  <a:pt x="0" y="1085065"/>
-                </a:cubicBezTo>
-                <a:cubicBezTo>
-                  <a:pt x="21856" y="935562"/>
-                  <a:pt x="-26363" y="762075"/>
-                  <a:pt x="0" y="542533"/>
-                </a:cubicBezTo>
-                <a:cubicBezTo>
-                  <a:pt x="26363" y="322991"/>
-                  <a:pt x="24427" y="211558"/>
-                  <a:pt x="0" y="0"/>
-                </a:cubicBezTo>
-                <a:close/>
-              </a:path>
-            </a:pathLst>
-          </a:custGeom>
-          <a:solidFill>
-            <a:schemeClr val="accent4">
-              <a:lumMod val="60000"/>
-              <a:lumOff val="40000"/>
-            </a:schemeClr>
-          </a:solidFill>
-          <a:ln w="12700">
-            <a:solidFill>
-              <a:schemeClr val="tx1"/>
-            </a:solidFill>
-            <a:extLst>
-              <a:ext uri="{C807C97D-BFC1-408E-A445-0C87EB9F89A2}">
-                <ask:lineSketchStyleProps xmlns:ask="http://schemas.microsoft.com/office/drawing/2018/sketchyshapes" sd="1219033472">
-                  <a:prstGeom prst="rect">
-                    <a:avLst/>
-                  </a:prstGeom>
-                  <ask:type>
-                    <ask:lineSketchFreehand/>
-                  </ask:type>
-                </ask:lineSketchStyleProps>
-              </a:ext>
-            </a:extLst>
-          </a:ln>
-          <a:effectLst/>
-        </p:spPr>
-        <p:style>
-          <a:lnRef idx="1">
-            <a:schemeClr val="accent4"/>
-          </a:lnRef>
-          <a:fillRef idx="2">
-            <a:schemeClr val="accent4"/>
-          </a:fillRef>
-          <a:effectRef idx="1">
-            <a:schemeClr val="accent4"/>
-          </a:effectRef>
-          <a:fontRef idx="minor">
-            <a:schemeClr val="dk1"/>
-          </a:fontRef>
-        </p:style>
-        <p:txBody>
-          <a:bodyPr rtlCol="0" anchor="ctr"/>
-          <a:lstStyle/>
-          <a:p>
-            <a:pPr algn="ctr"/>
-            <a:r>
-              <a:rPr lang="en-US" sz="1600" dirty="0"/>
-              <a:t>How about “Fortran”?</a:t>
             </a:r>
           </a:p>
         </p:txBody>

</xml_diff>